<commit_message>
presentation done, last stride
</commit_message>
<xml_diff>
--- a/Documents/TRSI/presentation/Cross-Linguistic Analysis for Depression Detection.pptx
+++ b/Documents/TRSI/presentation/Cross-Linguistic Analysis for Depression Detection.pptx
@@ -9,14 +9,18 @@
     <p:sldId id="257" r:id="rId3"/>
     <p:sldId id="258" r:id="rId4"/>
     <p:sldId id="259" r:id="rId5"/>
-    <p:sldId id="260" r:id="rId6"/>
-    <p:sldId id="261" r:id="rId7"/>
-    <p:sldId id="262" r:id="rId8"/>
-    <p:sldId id="263" r:id="rId9"/>
-    <p:sldId id="264" r:id="rId10"/>
-    <p:sldId id="265" r:id="rId11"/>
-    <p:sldId id="266" r:id="rId12"/>
-    <p:sldId id="267" r:id="rId13"/>
+    <p:sldId id="268" r:id="rId6"/>
+    <p:sldId id="269" r:id="rId7"/>
+    <p:sldId id="260" r:id="rId8"/>
+    <p:sldId id="261" r:id="rId9"/>
+    <p:sldId id="262" r:id="rId10"/>
+    <p:sldId id="263" r:id="rId11"/>
+    <p:sldId id="264" r:id="rId12"/>
+    <p:sldId id="265" r:id="rId13"/>
+    <p:sldId id="266" r:id="rId14"/>
+    <p:sldId id="270" r:id="rId15"/>
+    <p:sldId id="271" r:id="rId16"/>
+    <p:sldId id="267" r:id="rId17"/>
   </p:sldIdLst>
   <p:sldSz cx="12192000" cy="6858000"/>
   <p:notesSz cx="6858000" cy="9144000"/>
@@ -397,7 +401,7 @@
           <a:p>
             <a:fld id="{0E94DD7E-3813-422C-9F94-018588915AB5}" type="datetimeFigureOut">
               <a:rPr lang="en-US" smtClean="0"/>
-              <a:t>5/6/2024</a:t>
+              <a:t>6/28/2024</a:t>
             </a:fld>
             <a:endParaRPr lang="en-US"/>
           </a:p>
@@ -811,7 +815,7 @@
           <a:p>
             <a:fld id="{0E94DD7E-3813-422C-9F94-018588915AB5}" type="datetimeFigureOut">
               <a:rPr lang="en-US" smtClean="0"/>
-              <a:t>5/6/2024</a:t>
+              <a:t>6/28/2024</a:t>
             </a:fld>
             <a:endParaRPr lang="en-US"/>
           </a:p>
@@ -1147,7 +1151,7 @@
           <a:p>
             <a:fld id="{0E94DD7E-3813-422C-9F94-018588915AB5}" type="datetimeFigureOut">
               <a:rPr lang="en-US" smtClean="0"/>
-              <a:t>5/6/2024</a:t>
+              <a:t>6/28/2024</a:t>
             </a:fld>
             <a:endParaRPr lang="en-US"/>
           </a:p>
@@ -1552,7 +1556,7 @@
           <a:p>
             <a:fld id="{0E94DD7E-3813-422C-9F94-018588915AB5}" type="datetimeFigureOut">
               <a:rPr lang="en-US" smtClean="0"/>
-              <a:t>5/6/2024</a:t>
+              <a:t>6/28/2024</a:t>
             </a:fld>
             <a:endParaRPr lang="en-US"/>
           </a:p>
@@ -2120,7 +2124,7 @@
           <a:p>
             <a:fld id="{0E94DD7E-3813-422C-9F94-018588915AB5}" type="datetimeFigureOut">
               <a:rPr lang="en-US" smtClean="0"/>
-              <a:t>5/6/2024</a:t>
+              <a:t>6/28/2024</a:t>
             </a:fld>
             <a:endParaRPr lang="en-US"/>
           </a:p>
@@ -2801,7 +2805,7 @@
           <a:p>
             <a:fld id="{0E94DD7E-3813-422C-9F94-018588915AB5}" type="datetimeFigureOut">
               <a:rPr lang="en-US" smtClean="0"/>
-              <a:t>5/6/2024</a:t>
+              <a:t>6/28/2024</a:t>
             </a:fld>
             <a:endParaRPr lang="en-US"/>
           </a:p>
@@ -3714,7 +3718,7 @@
           <a:p>
             <a:fld id="{0E94DD7E-3813-422C-9F94-018588915AB5}" type="datetimeFigureOut">
               <a:rPr lang="en-US" smtClean="0"/>
-              <a:t>5/6/2024</a:t>
+              <a:t>6/28/2024</a:t>
             </a:fld>
             <a:endParaRPr lang="en-US"/>
           </a:p>
@@ -4027,7 +4031,7 @@
           <a:p>
             <a:fld id="{0E94DD7E-3813-422C-9F94-018588915AB5}" type="datetimeFigureOut">
               <a:rPr lang="en-US" smtClean="0"/>
-              <a:t>5/6/2024</a:t>
+              <a:t>6/28/2024</a:t>
             </a:fld>
             <a:endParaRPr lang="en-US"/>
           </a:p>
@@ -4291,7 +4295,7 @@
           <a:p>
             <a:fld id="{0E94DD7E-3813-422C-9F94-018588915AB5}" type="datetimeFigureOut">
               <a:rPr lang="en-US" smtClean="0"/>
-              <a:t>5/6/2024</a:t>
+              <a:t>6/28/2024</a:t>
             </a:fld>
             <a:endParaRPr lang="en-US"/>
           </a:p>
@@ -4614,7 +4618,7 @@
           <a:p>
             <a:fld id="{0E94DD7E-3813-422C-9F94-018588915AB5}" type="datetimeFigureOut">
               <a:rPr lang="en-US" smtClean="0"/>
-              <a:t>5/6/2024</a:t>
+              <a:t>6/28/2024</a:t>
             </a:fld>
             <a:endParaRPr lang="en-US"/>
           </a:p>
@@ -5003,7 +5007,7 @@
           <a:p>
             <a:fld id="{0E94DD7E-3813-422C-9F94-018588915AB5}" type="datetimeFigureOut">
               <a:rPr lang="en-US" smtClean="0"/>
-              <a:t>5/6/2024</a:t>
+              <a:t>6/28/2024</a:t>
             </a:fld>
             <a:endParaRPr lang="en-US"/>
           </a:p>
@@ -5379,7 +5383,7 @@
           <a:p>
             <a:fld id="{0E94DD7E-3813-422C-9F94-018588915AB5}" type="datetimeFigureOut">
               <a:rPr lang="en-US" smtClean="0"/>
-              <a:t>5/6/2024</a:t>
+              <a:t>6/28/2024</a:t>
             </a:fld>
             <a:endParaRPr lang="en-US"/>
           </a:p>
@@ -5885,7 +5889,7 @@
           <a:p>
             <a:fld id="{0E94DD7E-3813-422C-9F94-018588915AB5}" type="datetimeFigureOut">
               <a:rPr lang="en-US" smtClean="0"/>
-              <a:t>5/6/2024</a:t>
+              <a:t>6/28/2024</a:t>
             </a:fld>
             <a:endParaRPr lang="en-US"/>
           </a:p>
@@ -6142,7 +6146,7 @@
           <a:p>
             <a:fld id="{0E94DD7E-3813-422C-9F94-018588915AB5}" type="datetimeFigureOut">
               <a:rPr lang="en-US" smtClean="0"/>
-              <a:t>5/6/2024</a:t>
+              <a:t>6/28/2024</a:t>
             </a:fld>
             <a:endParaRPr lang="en-US"/>
           </a:p>
@@ -6305,7 +6309,7 @@
           <a:p>
             <a:fld id="{0E94DD7E-3813-422C-9F94-018588915AB5}" type="datetimeFigureOut">
               <a:rPr lang="en-US" smtClean="0"/>
-              <a:t>5/6/2024</a:t>
+              <a:t>6/28/2024</a:t>
             </a:fld>
             <a:endParaRPr lang="en-US"/>
           </a:p>
@@ -6695,7 +6699,7 @@
           <a:p>
             <a:fld id="{0E94DD7E-3813-422C-9F94-018588915AB5}" type="datetimeFigureOut">
               <a:rPr lang="en-US" smtClean="0"/>
-              <a:t>5/6/2024</a:t>
+              <a:t>6/28/2024</a:t>
             </a:fld>
             <a:endParaRPr lang="en-US"/>
           </a:p>
@@ -7104,7 +7108,7 @@
           <a:p>
             <a:fld id="{0E94DD7E-3813-422C-9F94-018588915AB5}" type="datetimeFigureOut">
               <a:rPr lang="en-US" smtClean="0"/>
-              <a:t>5/6/2024</a:t>
+              <a:t>6/28/2024</a:t>
             </a:fld>
             <a:endParaRPr lang="en-US"/>
           </a:p>
@@ -7348,7 +7352,7 @@
           <a:p>
             <a:fld id="{0E94DD7E-3813-422C-9F94-018588915AB5}" type="datetimeFigureOut">
               <a:rPr lang="en-US" smtClean="0"/>
-              <a:t>5/6/2024</a:t>
+              <a:t>6/28/2024</a:t>
             </a:fld>
             <a:endParaRPr lang="en-US"/>
           </a:p>
@@ -7863,48 +7867,76 @@
           <a:lstStyle/>
           <a:p>
             <a:r>
-              <a:rPr lang="en-US" dirty="0"/>
-              <a:t>Performance achieved in Romanian</a:t>
-            </a:r>
-          </a:p>
-        </p:txBody>
-      </p:sp>
-      <p:pic>
-        <p:nvPicPr>
-          <p:cNvPr id="4" name="Content Placeholder 3"/>
-          <p:cNvPicPr>
-            <a:picLocks noGrp="1" noChangeAspect="1"/>
-          </p:cNvPicPr>
+              <a:rPr lang="en-US" dirty="0" smtClean="0"/>
+              <a:t>Model for Romanian language</a:t>
+            </a:r>
+            <a:endParaRPr lang="en-US" dirty="0"/>
+          </a:p>
+        </p:txBody>
+      </p:sp>
+      <p:sp>
+        <p:nvSpPr>
+          <p:cNvPr id="3" name="Content Placeholder 2"/>
+          <p:cNvSpPr>
+            <a:spLocks noGrp="1"/>
+          </p:cNvSpPr>
           <p:nvPr>
             <p:ph idx="1"/>
           </p:nvPr>
-        </p:nvPicPr>
-        <p:blipFill>
-          <a:blip r:embed="rId2">
-            <a:extLst>
-              <a:ext uri="{28A0092B-C50C-407E-A947-70E740481C1C}">
-                <a14:useLocalDpi xmlns:a14="http://schemas.microsoft.com/office/drawing/2010/main" val="0"/>
-              </a:ext>
-            </a:extLst>
-          </a:blip>
-          <a:stretch>
-            <a:fillRect/>
-          </a:stretch>
-        </p:blipFill>
-        <p:spPr>
-          <a:xfrm>
-            <a:off x="2015129" y="2055446"/>
-            <a:ext cx="6944244" cy="4629496"/>
-          </a:xfrm>
-          <a:prstGeom prst="rect">
-            <a:avLst/>
-          </a:prstGeom>
-        </p:spPr>
-      </p:pic>
+        </p:nvSpPr>
+        <p:spPr/>
+        <p:txBody>
+          <a:bodyPr>
+            <a:normAutofit/>
+          </a:bodyPr>
+          <a:lstStyle/>
+          <a:p>
+            <a:r>
+              <a:rPr lang="en-US" sz="3200" dirty="0" smtClean="0"/>
+              <a:t>Dataset translated with </a:t>
+            </a:r>
+            <a:r>
+              <a:rPr lang="en-US" sz="3200" dirty="0" err="1" smtClean="0"/>
+              <a:t>Googletrans</a:t>
+            </a:r>
+            <a:r>
+              <a:rPr lang="en-US" sz="3200" dirty="0" smtClean="0"/>
+              <a:t> Python Library</a:t>
+            </a:r>
+          </a:p>
+          <a:p>
+            <a:r>
+              <a:rPr lang="en-US" sz="3200" dirty="0" smtClean="0"/>
+              <a:t>LIWC-15 </a:t>
+            </a:r>
+            <a:r>
+              <a:rPr lang="en-US" sz="3200" dirty="0"/>
+              <a:t>processing tool</a:t>
+            </a:r>
+          </a:p>
+          <a:p>
+            <a:r>
+              <a:rPr lang="en-US" sz="3200" dirty="0"/>
+              <a:t>Random Forrest </a:t>
+            </a:r>
+            <a:r>
+              <a:rPr lang="en-US" sz="3200" dirty="0" smtClean="0"/>
+              <a:t>Classifier</a:t>
+            </a:r>
+            <a:endParaRPr lang="en-US" sz="3200" dirty="0"/>
+          </a:p>
+          <a:p>
+            <a:r>
+              <a:rPr lang="en-US" sz="3200" dirty="0"/>
+              <a:t>Classification Metrics, Confusion Matrix, AUC, Feature Importance</a:t>
+            </a:r>
+          </a:p>
+        </p:txBody>
+      </p:sp>
     </p:spTree>
     <p:extLst>
       <p:ext uri="{BB962C8B-B14F-4D97-AF65-F5344CB8AC3E}">
-        <p14:creationId xmlns:p14="http://schemas.microsoft.com/office/powerpoint/2010/main" val="4141982234"/>
+        <p14:creationId xmlns:p14="http://schemas.microsoft.com/office/powerpoint/2010/main" val="1048840129"/>
       </p:ext>
     </p:extLst>
   </p:cSld>
@@ -7948,6 +7980,202 @@
           <a:p>
             <a:r>
               <a:rPr lang="en-US" dirty="0" smtClean="0"/>
+              <a:t>Performance achieved in Romanian</a:t>
+            </a:r>
+            <a:endParaRPr lang="en-US" dirty="0"/>
+          </a:p>
+        </p:txBody>
+      </p:sp>
+      <p:pic>
+        <p:nvPicPr>
+          <p:cNvPr id="4" name="Content Placeholder 3"/>
+          <p:cNvPicPr>
+            <a:picLocks noGrp="1" noChangeAspect="1"/>
+          </p:cNvPicPr>
+          <p:nvPr>
+            <p:ph idx="1"/>
+          </p:nvPr>
+        </p:nvPicPr>
+        <p:blipFill>
+          <a:blip r:embed="rId2">
+            <a:extLst>
+              <a:ext uri="{28A0092B-C50C-407E-A947-70E740481C1C}">
+                <a14:useLocalDpi xmlns:a14="http://schemas.microsoft.com/office/drawing/2010/main" val="0"/>
+              </a:ext>
+            </a:extLst>
+          </a:blip>
+          <a:stretch>
+            <a:fillRect/>
+          </a:stretch>
+        </p:blipFill>
+        <p:spPr>
+          <a:xfrm>
+            <a:off x="1325247" y="2418726"/>
+            <a:ext cx="4990831" cy="3743123"/>
+          </a:xfrm>
+        </p:spPr>
+      </p:pic>
+      <p:pic>
+        <p:nvPicPr>
+          <p:cNvPr id="5" name="Picture 4"/>
+          <p:cNvPicPr>
+            <a:picLocks noChangeAspect="1"/>
+          </p:cNvPicPr>
+          <p:nvPr/>
+        </p:nvPicPr>
+        <p:blipFill>
+          <a:blip r:embed="rId3">
+            <a:extLst>
+              <a:ext uri="{28A0092B-C50C-407E-A947-70E740481C1C}">
+                <a14:useLocalDpi xmlns:a14="http://schemas.microsoft.com/office/drawing/2010/main" val="0"/>
+              </a:ext>
+            </a:extLst>
+          </a:blip>
+          <a:stretch>
+            <a:fillRect/>
+          </a:stretch>
+        </p:blipFill>
+        <p:spPr>
+          <a:xfrm>
+            <a:off x="6316078" y="2418727"/>
+            <a:ext cx="4990830" cy="3743123"/>
+          </a:xfrm>
+          <a:prstGeom prst="rect">
+            <a:avLst/>
+          </a:prstGeom>
+        </p:spPr>
+      </p:pic>
+    </p:spTree>
+    <p:extLst>
+      <p:ext uri="{BB962C8B-B14F-4D97-AF65-F5344CB8AC3E}">
+        <p14:creationId xmlns:p14="http://schemas.microsoft.com/office/powerpoint/2010/main" val="1975327160"/>
+      </p:ext>
+    </p:extLst>
+  </p:cSld>
+  <p:clrMapOvr>
+    <a:masterClrMapping/>
+  </p:clrMapOvr>
+</p:sld>
+</file>
+
+<file path=ppt/slides/slide12.xml><?xml version="1.0" encoding="utf-8"?>
+<p:sld xmlns:a="http://schemas.openxmlformats.org/drawingml/2006/main" xmlns:r="http://schemas.openxmlformats.org/officeDocument/2006/relationships" xmlns:p="http://schemas.openxmlformats.org/presentationml/2006/main">
+  <p:cSld>
+    <p:spTree>
+      <p:nvGrpSpPr>
+        <p:cNvPr id="1" name=""/>
+        <p:cNvGrpSpPr/>
+        <p:nvPr/>
+      </p:nvGrpSpPr>
+      <p:grpSpPr>
+        <a:xfrm>
+          <a:off x="0" y="0"/>
+          <a:ext cx="0" cy="0"/>
+          <a:chOff x="0" y="0"/>
+          <a:chExt cx="0" cy="0"/>
+        </a:xfrm>
+      </p:grpSpPr>
+      <p:sp>
+        <p:nvSpPr>
+          <p:cNvPr id="2" name="Title 1"/>
+          <p:cNvSpPr>
+            <a:spLocks noGrp="1"/>
+          </p:cNvSpPr>
+          <p:nvPr>
+            <p:ph type="title"/>
+          </p:nvPr>
+        </p:nvSpPr>
+        <p:spPr/>
+        <p:txBody>
+          <a:bodyPr/>
+          <a:lstStyle/>
+          <a:p>
+            <a:r>
+              <a:rPr lang="en-US" dirty="0"/>
+              <a:t>Performance achieved in Romanian</a:t>
+            </a:r>
+          </a:p>
+        </p:txBody>
+      </p:sp>
+      <p:pic>
+        <p:nvPicPr>
+          <p:cNvPr id="4" name="Content Placeholder 3"/>
+          <p:cNvPicPr>
+            <a:picLocks noGrp="1" noChangeAspect="1"/>
+          </p:cNvPicPr>
+          <p:nvPr>
+            <p:ph idx="1"/>
+          </p:nvPr>
+        </p:nvPicPr>
+        <p:blipFill>
+          <a:blip r:embed="rId2">
+            <a:extLst>
+              <a:ext uri="{28A0092B-C50C-407E-A947-70E740481C1C}">
+                <a14:useLocalDpi xmlns:a14="http://schemas.microsoft.com/office/drawing/2010/main" val="0"/>
+              </a:ext>
+            </a:extLst>
+          </a:blip>
+          <a:stretch>
+            <a:fillRect/>
+          </a:stretch>
+        </p:blipFill>
+        <p:spPr>
+          <a:xfrm>
+            <a:off x="2015129" y="2055446"/>
+            <a:ext cx="6944244" cy="4629496"/>
+          </a:xfrm>
+          <a:prstGeom prst="rect">
+            <a:avLst/>
+          </a:prstGeom>
+        </p:spPr>
+      </p:pic>
+    </p:spTree>
+    <p:extLst>
+      <p:ext uri="{BB962C8B-B14F-4D97-AF65-F5344CB8AC3E}">
+        <p14:creationId xmlns:p14="http://schemas.microsoft.com/office/powerpoint/2010/main" val="4141982234"/>
+      </p:ext>
+    </p:extLst>
+  </p:cSld>
+  <p:clrMapOvr>
+    <a:masterClrMapping/>
+  </p:clrMapOvr>
+</p:sld>
+</file>
+
+<file path=ppt/slides/slide13.xml><?xml version="1.0" encoding="utf-8"?>
+<p:sld xmlns:a="http://schemas.openxmlformats.org/drawingml/2006/main" xmlns:r="http://schemas.openxmlformats.org/officeDocument/2006/relationships" xmlns:p="http://schemas.openxmlformats.org/presentationml/2006/main">
+  <p:cSld>
+    <p:spTree>
+      <p:nvGrpSpPr>
+        <p:cNvPr id="1" name=""/>
+        <p:cNvGrpSpPr/>
+        <p:nvPr/>
+      </p:nvGrpSpPr>
+      <p:grpSpPr>
+        <a:xfrm>
+          <a:off x="0" y="0"/>
+          <a:ext cx="0" cy="0"/>
+          <a:chOff x="0" y="0"/>
+          <a:chExt cx="0" cy="0"/>
+        </a:xfrm>
+      </p:grpSpPr>
+      <p:sp>
+        <p:nvSpPr>
+          <p:cNvPr id="2" name="Title 1"/>
+          <p:cNvSpPr>
+            <a:spLocks noGrp="1"/>
+          </p:cNvSpPr>
+          <p:nvPr>
+            <p:ph type="title"/>
+          </p:nvPr>
+        </p:nvSpPr>
+        <p:spPr/>
+        <p:txBody>
+          <a:bodyPr/>
+          <a:lstStyle/>
+          <a:p>
+            <a:r>
+              <a:rPr lang="en-US" dirty="0" smtClean="0"/>
               <a:t>Weaknesses</a:t>
             </a:r>
             <a:endParaRPr lang="en-US" dirty="0"/>
@@ -8018,7 +8246,257 @@
 </p:sld>
 </file>
 
-<file path=ppt/slides/slide12.xml><?xml version="1.0" encoding="utf-8"?>
+<file path=ppt/slides/slide14.xml><?xml version="1.0" encoding="utf-8"?>
+<p:sld xmlns:a="http://schemas.openxmlformats.org/drawingml/2006/main" xmlns:r="http://schemas.openxmlformats.org/officeDocument/2006/relationships" xmlns:p="http://schemas.openxmlformats.org/presentationml/2006/main">
+  <p:cSld>
+    <p:spTree>
+      <p:nvGrpSpPr>
+        <p:cNvPr id="1" name=""/>
+        <p:cNvGrpSpPr/>
+        <p:nvPr/>
+      </p:nvGrpSpPr>
+      <p:grpSpPr>
+        <a:xfrm>
+          <a:off x="0" y="0"/>
+          <a:ext cx="0" cy="0"/>
+          <a:chOff x="0" y="0"/>
+          <a:chExt cx="0" cy="0"/>
+        </a:xfrm>
+      </p:grpSpPr>
+      <p:sp>
+        <p:nvSpPr>
+          <p:cNvPr id="2" name="Title 1"/>
+          <p:cNvSpPr>
+            <a:spLocks noGrp="1"/>
+          </p:cNvSpPr>
+          <p:nvPr>
+            <p:ph type="title"/>
+          </p:nvPr>
+        </p:nvSpPr>
+        <p:spPr/>
+        <p:txBody>
+          <a:bodyPr/>
+          <a:lstStyle/>
+          <a:p>
+            <a:r>
+              <a:rPr lang="en-US" dirty="0" smtClean="0"/>
+              <a:t>Chrome Extension for Detecting Depression</a:t>
+            </a:r>
+            <a:endParaRPr lang="en-US" dirty="0"/>
+          </a:p>
+        </p:txBody>
+      </p:sp>
+      <p:sp>
+        <p:nvSpPr>
+          <p:cNvPr id="3" name="Content Placeholder 2"/>
+          <p:cNvSpPr>
+            <a:spLocks noGrp="1"/>
+          </p:cNvSpPr>
+          <p:nvPr>
+            <p:ph idx="1"/>
+          </p:nvPr>
+        </p:nvSpPr>
+        <p:spPr/>
+        <p:txBody>
+          <a:bodyPr/>
+          <a:lstStyle/>
+          <a:p>
+            <a:r>
+              <a:rPr lang="en-US" dirty="0" smtClean="0"/>
+              <a:t>Easily accessible from where the user wants to analyze the possible text indicative of depression</a:t>
+            </a:r>
+          </a:p>
+          <a:p>
+            <a:r>
+              <a:rPr lang="en-US" dirty="0" smtClean="0"/>
+              <a:t>Multiple languages supported </a:t>
+            </a:r>
+          </a:p>
+          <a:p>
+            <a:endParaRPr lang="en-US" dirty="0" smtClean="0"/>
+          </a:p>
+        </p:txBody>
+      </p:sp>
+      <p:pic>
+        <p:nvPicPr>
+          <p:cNvPr id="4" name="Picture 3"/>
+          <p:cNvPicPr>
+            <a:picLocks noChangeAspect="1"/>
+          </p:cNvPicPr>
+          <p:nvPr/>
+        </p:nvPicPr>
+        <p:blipFill>
+          <a:blip r:embed="rId2">
+            <a:extLst>
+              <a:ext uri="{28A0092B-C50C-407E-A947-70E740481C1C}">
+                <a14:useLocalDpi xmlns:a14="http://schemas.microsoft.com/office/drawing/2010/main" val="0"/>
+              </a:ext>
+            </a:extLst>
+          </a:blip>
+          <a:stretch>
+            <a:fillRect/>
+          </a:stretch>
+        </p:blipFill>
+        <p:spPr>
+          <a:xfrm>
+            <a:off x="2973629" y="3623348"/>
+            <a:ext cx="5277587" cy="2600688"/>
+          </a:xfrm>
+          <a:prstGeom prst="rect">
+            <a:avLst/>
+          </a:prstGeom>
+        </p:spPr>
+      </p:pic>
+    </p:spTree>
+    <p:extLst>
+      <p:ext uri="{BB962C8B-B14F-4D97-AF65-F5344CB8AC3E}">
+        <p14:creationId xmlns:p14="http://schemas.microsoft.com/office/powerpoint/2010/main" val="202797163"/>
+      </p:ext>
+    </p:extLst>
+  </p:cSld>
+  <p:clrMapOvr>
+    <a:masterClrMapping/>
+  </p:clrMapOvr>
+</p:sld>
+</file>
+
+<file path=ppt/slides/slide15.xml><?xml version="1.0" encoding="utf-8"?>
+<p:sld xmlns:a="http://schemas.openxmlformats.org/drawingml/2006/main" xmlns:r="http://schemas.openxmlformats.org/officeDocument/2006/relationships" xmlns:p="http://schemas.openxmlformats.org/presentationml/2006/main">
+  <p:cSld>
+    <p:spTree>
+      <p:nvGrpSpPr>
+        <p:cNvPr id="1" name=""/>
+        <p:cNvGrpSpPr/>
+        <p:nvPr/>
+      </p:nvGrpSpPr>
+      <p:grpSpPr>
+        <a:xfrm>
+          <a:off x="0" y="0"/>
+          <a:ext cx="0" cy="0"/>
+          <a:chOff x="0" y="0"/>
+          <a:chExt cx="0" cy="0"/>
+        </a:xfrm>
+      </p:grpSpPr>
+      <p:sp>
+        <p:nvSpPr>
+          <p:cNvPr id="2" name="Title 1"/>
+          <p:cNvSpPr>
+            <a:spLocks noGrp="1"/>
+          </p:cNvSpPr>
+          <p:nvPr>
+            <p:ph type="title"/>
+          </p:nvPr>
+        </p:nvSpPr>
+        <p:spPr/>
+        <p:txBody>
+          <a:bodyPr/>
+          <a:lstStyle/>
+          <a:p>
+            <a:r>
+              <a:rPr lang="en-US" dirty="0" smtClean="0"/>
+              <a:t>Output</a:t>
+            </a:r>
+            <a:endParaRPr lang="en-US" dirty="0"/>
+          </a:p>
+        </p:txBody>
+      </p:sp>
+      <p:sp>
+        <p:nvSpPr>
+          <p:cNvPr id="3" name="Content Placeholder 2"/>
+          <p:cNvSpPr>
+            <a:spLocks noGrp="1"/>
+          </p:cNvSpPr>
+          <p:nvPr>
+            <p:ph idx="1"/>
+          </p:nvPr>
+        </p:nvSpPr>
+        <p:spPr/>
+        <p:txBody>
+          <a:bodyPr/>
+          <a:lstStyle/>
+          <a:p>
+            <a:r>
+              <a:rPr lang="en-US" dirty="0" smtClean="0"/>
+              <a:t>Messages shown for depression or no depression found </a:t>
+            </a:r>
+            <a:endParaRPr lang="en-US" dirty="0"/>
+          </a:p>
+        </p:txBody>
+      </p:sp>
+      <p:pic>
+        <p:nvPicPr>
+          <p:cNvPr id="6" name="Picture 5"/>
+          <p:cNvPicPr>
+            <a:picLocks noChangeAspect="1"/>
+          </p:cNvPicPr>
+          <p:nvPr/>
+        </p:nvPicPr>
+        <p:blipFill>
+          <a:blip r:embed="rId2">
+            <a:extLst>
+              <a:ext uri="{28A0092B-C50C-407E-A947-70E740481C1C}">
+                <a14:useLocalDpi xmlns:a14="http://schemas.microsoft.com/office/drawing/2010/main" val="0"/>
+              </a:ext>
+            </a:extLst>
+          </a:blip>
+          <a:stretch>
+            <a:fillRect/>
+          </a:stretch>
+        </p:blipFill>
+        <p:spPr>
+          <a:xfrm>
+            <a:off x="680321" y="2899909"/>
+            <a:ext cx="5251662" cy="3192337"/>
+          </a:xfrm>
+          <a:prstGeom prst="rect">
+            <a:avLst/>
+          </a:prstGeom>
+        </p:spPr>
+      </p:pic>
+      <p:pic>
+        <p:nvPicPr>
+          <p:cNvPr id="7" name="Picture 6"/>
+          <p:cNvPicPr>
+            <a:picLocks noChangeAspect="1"/>
+          </p:cNvPicPr>
+          <p:nvPr/>
+        </p:nvPicPr>
+        <p:blipFill>
+          <a:blip r:embed="rId3">
+            <a:extLst>
+              <a:ext uri="{28A0092B-C50C-407E-A947-70E740481C1C}">
+                <a14:useLocalDpi xmlns:a14="http://schemas.microsoft.com/office/drawing/2010/main" val="0"/>
+              </a:ext>
+            </a:extLst>
+          </a:blip>
+          <a:stretch>
+            <a:fillRect/>
+          </a:stretch>
+        </p:blipFill>
+        <p:spPr>
+          <a:xfrm>
+            <a:off x="5931983" y="2899908"/>
+            <a:ext cx="5269646" cy="3192337"/>
+          </a:xfrm>
+          <a:prstGeom prst="rect">
+            <a:avLst/>
+          </a:prstGeom>
+        </p:spPr>
+      </p:pic>
+    </p:spTree>
+    <p:extLst>
+      <p:ext uri="{BB962C8B-B14F-4D97-AF65-F5344CB8AC3E}">
+        <p14:creationId xmlns:p14="http://schemas.microsoft.com/office/powerpoint/2010/main" val="3201590184"/>
+      </p:ext>
+    </p:extLst>
+  </p:cSld>
+  <p:clrMapOvr>
+    <a:masterClrMapping/>
+  </p:clrMapOvr>
+</p:sld>
+</file>
+
+<file path=ppt/slides/slide16.xml><?xml version="1.0" encoding="utf-8"?>
 <p:sld xmlns:a="http://schemas.openxmlformats.org/drawingml/2006/main" xmlns:r="http://schemas.openxmlformats.org/officeDocument/2006/relationships" xmlns:p="http://schemas.openxmlformats.org/presentationml/2006/main">
   <p:cSld>
     <p:spTree>
@@ -8232,11 +8710,7 @@
           <a:p>
             <a:r>
               <a:rPr lang="en-US" dirty="0" smtClean="0"/>
-              <a:t>Proposed </a:t>
-            </a:r>
-            <a:r>
-              <a:rPr lang="en-US" dirty="0" smtClean="0"/>
-              <a:t>prevention method</a:t>
+              <a:t>Proposed prevention method</a:t>
             </a:r>
             <a:endParaRPr lang="en-US" dirty="0"/>
           </a:p>
@@ -8332,11 +8806,7 @@
           <a:p>
             <a:r>
               <a:rPr lang="en-US" dirty="0" smtClean="0"/>
-              <a:t>Training </a:t>
-            </a:r>
-            <a:r>
-              <a:rPr lang="en-US" dirty="0" smtClean="0"/>
-              <a:t>Details</a:t>
+              <a:t>Training Details</a:t>
             </a:r>
             <a:endParaRPr lang="en-US" dirty="0"/>
           </a:p>
@@ -8367,11 +8837,7 @@
           <a:p>
             <a:r>
               <a:rPr lang="en-US" sz="3200" dirty="0" smtClean="0"/>
-              <a:t>LIWC-22 </a:t>
-            </a:r>
-            <a:r>
-              <a:rPr lang="en-US" sz="3200" dirty="0" smtClean="0"/>
-              <a:t>processing tool</a:t>
+              <a:t>LIWC-22 processing tool</a:t>
             </a:r>
           </a:p>
           <a:p>
@@ -8435,43 +8901,59 @@
           <a:lstStyle/>
           <a:p>
             <a:r>
-              <a:rPr lang="en-US" dirty="0" smtClean="0"/>
-              <a:t>LIWC dictionary categories examples</a:t>
-            </a:r>
+              <a:rPr lang="en-US" dirty="0"/>
+              <a:t>Linguistic Inquiry and Word Count</a:t>
+            </a:r>
+          </a:p>
+        </p:txBody>
+      </p:sp>
+      <p:sp>
+        <p:nvSpPr>
+          <p:cNvPr id="3" name="Content Placeholder 2"/>
+          <p:cNvSpPr>
+            <a:spLocks noGrp="1"/>
+          </p:cNvSpPr>
+          <p:nvPr>
+            <p:ph idx="1"/>
+          </p:nvPr>
+        </p:nvSpPr>
+        <p:spPr/>
+        <p:txBody>
+          <a:bodyPr/>
+          <a:lstStyle/>
+          <a:p>
+            <a:r>
+              <a:rPr lang="en-US" dirty="0"/>
+              <a:t>Categorizes words in different psychological states and grammar parts</a:t>
+            </a:r>
+          </a:p>
+          <a:p>
+            <a:r>
+              <a:rPr lang="en-US" dirty="0"/>
+              <a:t>Uses a dictionary that contains the category as key and the words as values</a:t>
+            </a:r>
+          </a:p>
+          <a:p>
+            <a:r>
+              <a:rPr lang="en-US" dirty="0"/>
+              <a:t>Translated for multiple languages</a:t>
+            </a:r>
+          </a:p>
+          <a:p>
+            <a:r>
+              <a:rPr lang="en-US" dirty="0"/>
+              <a:t>Easy to use</a:t>
+            </a:r>
+          </a:p>
+          <a:p>
             <a:endParaRPr lang="en-US" dirty="0"/>
           </a:p>
         </p:txBody>
       </p:sp>
-      <p:pic>
-        <p:nvPicPr>
-          <p:cNvPr id="4" name="Content Placeholder 3"/>
-          <p:cNvPicPr>
-            <a:picLocks noGrp="1" noChangeAspect="1"/>
-          </p:cNvPicPr>
-          <p:nvPr>
-            <p:ph idx="1"/>
-          </p:nvPr>
-        </p:nvPicPr>
-        <p:blipFill>
-          <a:blip r:embed="rId2"/>
-          <a:stretch>
-            <a:fillRect/>
-          </a:stretch>
-        </p:blipFill>
-        <p:spPr>
-          <a:xfrm>
-            <a:off x="2206925" y="2151945"/>
-            <a:ext cx="6560652" cy="4170057"/>
-          </a:xfrm>
-          <a:prstGeom prst="rect">
-            <a:avLst/>
-          </a:prstGeom>
-        </p:spPr>
-      </p:pic>
     </p:spTree>
     <p:extLst>
       <p:ext uri="{BB962C8B-B14F-4D97-AF65-F5344CB8AC3E}">
-        <p14:creationId xmlns:p14="http://schemas.microsoft.com/office/powerpoint/2010/main" val="1281591679"/>
+        <p14:creationId xmlns:p14="http://schemas.microsoft.com/office/powerpoint/2010/main" val="1269117920"/>
       </p:ext>
     </p:extLst>
   </p:cSld>
@@ -8514,8 +8996,35 @@
           <a:lstStyle/>
           <a:p>
             <a:r>
-              <a:rPr lang="en-US" dirty="0" smtClean="0"/>
-              <a:t>Performance achieved in English</a:t>
+              <a:rPr lang="en-US" dirty="0"/>
+              <a:t>Output</a:t>
+            </a:r>
+          </a:p>
+        </p:txBody>
+      </p:sp>
+      <p:sp>
+        <p:nvSpPr>
+          <p:cNvPr id="3" name="Content Placeholder 2"/>
+          <p:cNvSpPr>
+            <a:spLocks noGrp="1"/>
+          </p:cNvSpPr>
+          <p:nvPr>
+            <p:ph idx="1"/>
+          </p:nvPr>
+        </p:nvSpPr>
+        <p:spPr>
+          <a:xfrm>
+            <a:off x="680321" y="2081896"/>
+            <a:ext cx="9613861" cy="3599316"/>
+          </a:xfrm>
+        </p:spPr>
+        <p:txBody>
+          <a:bodyPr/>
+          <a:lstStyle/>
+          <a:p>
+            <a:r>
+              <a:rPr lang="en-US" dirty="0"/>
+              <a:t>Contains selected metrics and their respective number of words found</a:t>
             </a:r>
             <a:endParaRPr lang="en-US" dirty="0"/>
           </a:p>
@@ -8523,87 +9032,22 @@
       </p:sp>
       <p:pic>
         <p:nvPicPr>
-          <p:cNvPr id="4" name="Content Placeholder 3"/>
-          <p:cNvPicPr>
-            <a:picLocks noGrp="1" noChangeAspect="1"/>
-          </p:cNvPicPr>
-          <p:nvPr>
-            <p:ph idx="1"/>
-          </p:nvPr>
-        </p:nvPicPr>
-        <p:blipFill>
-          <a:blip r:embed="rId2">
-            <a:extLst>
-              <a:ext uri="{28A0092B-C50C-407E-A947-70E740481C1C}">
-                <a14:useLocalDpi xmlns:a14="http://schemas.microsoft.com/office/drawing/2010/main" val="0"/>
-              </a:ext>
-            </a:extLst>
-          </a:blip>
-          <a:stretch>
-            <a:fillRect/>
-          </a:stretch>
-        </p:blipFill>
-        <p:spPr>
-          <a:xfrm>
-            <a:off x="98722" y="2452322"/>
-            <a:ext cx="4092061" cy="3069046"/>
-          </a:xfrm>
-        </p:spPr>
-      </p:pic>
-      <p:pic>
-        <p:nvPicPr>
-          <p:cNvPr id="5" name="Picture 4"/>
+          <p:cNvPr id="4" name="Picture 3"/>
           <p:cNvPicPr>
             <a:picLocks noChangeAspect="1"/>
           </p:cNvPicPr>
           <p:nvPr/>
         </p:nvPicPr>
         <p:blipFill>
-          <a:blip r:embed="rId3">
-            <a:extLst>
-              <a:ext uri="{28A0092B-C50C-407E-A947-70E740481C1C}">
-                <a14:useLocalDpi xmlns:a14="http://schemas.microsoft.com/office/drawing/2010/main" val="0"/>
-              </a:ext>
-            </a:extLst>
-          </a:blip>
+          <a:blip r:embed="rId2"/>
           <a:stretch>
             <a:fillRect/>
           </a:stretch>
         </p:blipFill>
         <p:spPr>
           <a:xfrm>
-            <a:off x="4190783" y="2452322"/>
-            <a:ext cx="4092061" cy="3069046"/>
-          </a:xfrm>
-          <a:prstGeom prst="rect">
-            <a:avLst/>
-          </a:prstGeom>
-        </p:spPr>
-      </p:pic>
-      <p:pic>
-        <p:nvPicPr>
-          <p:cNvPr id="6" name="Picture 5"/>
-          <p:cNvPicPr>
-            <a:picLocks noChangeAspect="1"/>
-          </p:cNvPicPr>
-          <p:nvPr/>
-        </p:nvPicPr>
-        <p:blipFill>
-          <a:blip r:embed="rId4">
-            <a:extLst>
-              <a:ext uri="{28A0092B-C50C-407E-A947-70E740481C1C}">
-                <a14:useLocalDpi xmlns:a14="http://schemas.microsoft.com/office/drawing/2010/main" val="0"/>
-              </a:ext>
-            </a:extLst>
-          </a:blip>
-          <a:stretch>
-            <a:fillRect/>
-          </a:stretch>
-        </p:blipFill>
-        <p:spPr>
-          <a:xfrm>
-            <a:off x="7989057" y="2452322"/>
-            <a:ext cx="4092061" cy="3069046"/>
+            <a:off x="154227" y="2953600"/>
+            <a:ext cx="11918713" cy="3377477"/>
           </a:xfrm>
           <a:prstGeom prst="rect">
             <a:avLst/>
@@ -8613,7 +9057,7 @@
     </p:spTree>
     <p:extLst>
       <p:ext uri="{BB962C8B-B14F-4D97-AF65-F5344CB8AC3E}">
-        <p14:creationId xmlns:p14="http://schemas.microsoft.com/office/powerpoint/2010/main" val="3542722364"/>
+        <p14:creationId xmlns:p14="http://schemas.microsoft.com/office/powerpoint/2010/main" val="3558123819"/>
       </p:ext>
     </p:extLst>
   </p:cSld>
@@ -8656,9 +9100,10 @@
           <a:lstStyle/>
           <a:p>
             <a:r>
-              <a:rPr lang="en-US" dirty="0"/>
-              <a:t>Performance achieved in English</a:t>
-            </a:r>
+              <a:rPr lang="en-US" dirty="0" smtClean="0"/>
+              <a:t>LIWC dictionary categories examples</a:t>
+            </a:r>
+            <a:endParaRPr lang="en-US" dirty="0"/>
           </a:p>
         </p:txBody>
       </p:sp>
@@ -8673,21 +9118,15 @@
           </p:nvPr>
         </p:nvPicPr>
         <p:blipFill>
-          <a:blip r:embed="rId2">
-            <a:extLst>
-              <a:ext uri="{28A0092B-C50C-407E-A947-70E740481C1C}">
-                <a14:useLocalDpi xmlns:a14="http://schemas.microsoft.com/office/drawing/2010/main" val="0"/>
-              </a:ext>
-            </a:extLst>
-          </a:blip>
+          <a:blip r:embed="rId2"/>
           <a:stretch>
             <a:fillRect/>
           </a:stretch>
         </p:blipFill>
         <p:spPr>
           <a:xfrm>
-            <a:off x="2015128" y="2046654"/>
-            <a:ext cx="6944245" cy="4629497"/>
+            <a:off x="2206925" y="2151945"/>
+            <a:ext cx="6560652" cy="4170057"/>
           </a:xfrm>
           <a:prstGeom prst="rect">
             <a:avLst/>
@@ -8697,7 +9136,7 @@
     </p:spTree>
     <p:extLst>
       <p:ext uri="{BB962C8B-B14F-4D97-AF65-F5344CB8AC3E}">
-        <p14:creationId xmlns:p14="http://schemas.microsoft.com/office/powerpoint/2010/main" val="3786925155"/>
+        <p14:creationId xmlns:p14="http://schemas.microsoft.com/office/powerpoint/2010/main" val="1281591679"/>
       </p:ext>
     </p:extLst>
   </p:cSld>
@@ -8741,76 +9180,75 @@
           <a:p>
             <a:r>
               <a:rPr lang="en-US" dirty="0" smtClean="0"/>
-              <a:t>Model for Romanian language</a:t>
+              <a:t>Performance achieved in English</a:t>
             </a:r>
             <a:endParaRPr lang="en-US" dirty="0"/>
           </a:p>
         </p:txBody>
       </p:sp>
-      <p:sp>
-        <p:nvSpPr>
-          <p:cNvPr id="3" name="Content Placeholder 2"/>
-          <p:cNvSpPr>
-            <a:spLocks noGrp="1"/>
-          </p:cNvSpPr>
+      <p:pic>
+        <p:nvPicPr>
+          <p:cNvPr id="4" name="Content Placeholder 3"/>
+          <p:cNvPicPr>
+            <a:picLocks noGrp="1" noChangeAspect="1"/>
+          </p:cNvPicPr>
           <p:nvPr>
             <p:ph idx="1"/>
           </p:nvPr>
-        </p:nvSpPr>
-        <p:spPr/>
-        <p:txBody>
-          <a:bodyPr>
-            <a:normAutofit/>
-          </a:bodyPr>
-          <a:lstStyle/>
-          <a:p>
-            <a:r>
-              <a:rPr lang="en-US" sz="3200" dirty="0" smtClean="0"/>
-              <a:t>Dataset translated with </a:t>
-            </a:r>
-            <a:r>
-              <a:rPr lang="en-US" sz="3200" dirty="0" err="1" smtClean="0"/>
-              <a:t>Googletrans</a:t>
-            </a:r>
-            <a:r>
-              <a:rPr lang="en-US" sz="3200" dirty="0" smtClean="0"/>
-              <a:t> Python Library</a:t>
-            </a:r>
-          </a:p>
-          <a:p>
-            <a:r>
-              <a:rPr lang="en-US" sz="3200" dirty="0" smtClean="0"/>
-              <a:t>LIWC-15 </a:t>
-            </a:r>
-            <a:r>
-              <a:rPr lang="en-US" sz="3200" dirty="0"/>
-              <a:t>processing tool</a:t>
-            </a:r>
-          </a:p>
-          <a:p>
-            <a:r>
-              <a:rPr lang="en-US" sz="3200" dirty="0"/>
-              <a:t>Random Forrest </a:t>
-            </a:r>
-            <a:r>
-              <a:rPr lang="en-US" sz="3200" dirty="0" smtClean="0"/>
-              <a:t>Classifier</a:t>
-            </a:r>
-            <a:endParaRPr lang="en-US" sz="3200" dirty="0"/>
-          </a:p>
-          <a:p>
-            <a:r>
-              <a:rPr lang="en-US" sz="3200" dirty="0"/>
-              <a:t>Classification Metrics, Confusion Matrix, AUC, Feature Importance</a:t>
-            </a:r>
-            <a:endParaRPr lang="en-US" sz="3200" dirty="0"/>
-          </a:p>
-        </p:txBody>
-      </p:sp>
+        </p:nvPicPr>
+        <p:blipFill>
+          <a:blip r:embed="rId2">
+            <a:extLst>
+              <a:ext uri="{28A0092B-C50C-407E-A947-70E740481C1C}">
+                <a14:useLocalDpi xmlns:a14="http://schemas.microsoft.com/office/drawing/2010/main" val="0"/>
+              </a:ext>
+            </a:extLst>
+          </a:blip>
+          <a:stretch>
+            <a:fillRect/>
+          </a:stretch>
+        </p:blipFill>
+        <p:spPr>
+          <a:xfrm>
+            <a:off x="1030706" y="2452322"/>
+            <a:ext cx="4974440" cy="3730830"/>
+          </a:xfrm>
+        </p:spPr>
+      </p:pic>
+      <p:pic>
+        <p:nvPicPr>
+          <p:cNvPr id="5" name="Picture 4"/>
+          <p:cNvPicPr>
+            <a:picLocks noChangeAspect="1"/>
+          </p:cNvPicPr>
+          <p:nvPr/>
+        </p:nvPicPr>
+        <p:blipFill>
+          <a:blip r:embed="rId3">
+            <a:extLst>
+              <a:ext uri="{28A0092B-C50C-407E-A947-70E740481C1C}">
+                <a14:useLocalDpi xmlns:a14="http://schemas.microsoft.com/office/drawing/2010/main" val="0"/>
+              </a:ext>
+            </a:extLst>
+          </a:blip>
+          <a:stretch>
+            <a:fillRect/>
+          </a:stretch>
+        </p:blipFill>
+        <p:spPr>
+          <a:xfrm>
+            <a:off x="6005146" y="2452322"/>
+            <a:ext cx="4974440" cy="3730830"/>
+          </a:xfrm>
+          <a:prstGeom prst="rect">
+            <a:avLst/>
+          </a:prstGeom>
+        </p:spPr>
+      </p:pic>
     </p:spTree>
     <p:extLst>
       <p:ext uri="{BB962C8B-B14F-4D97-AF65-F5344CB8AC3E}">
-        <p14:creationId xmlns:p14="http://schemas.microsoft.com/office/powerpoint/2010/main" val="1048840129"/>
+        <p14:creationId xmlns:p14="http://schemas.microsoft.com/office/powerpoint/2010/main" val="3542722364"/>
       </p:ext>
     </p:extLst>
   </p:cSld>
@@ -8853,10 +9291,9 @@
           <a:lstStyle/>
           <a:p>
             <a:r>
-              <a:rPr lang="en-US" dirty="0" smtClean="0"/>
-              <a:t>Performance achieved in Romanian</a:t>
-            </a:r>
-            <a:endParaRPr lang="en-US" dirty="0"/>
+              <a:rPr lang="en-US" dirty="0"/>
+              <a:t>Performance achieved in English</a:t>
+            </a:r>
           </a:p>
         </p:txBody>
       </p:sp>
@@ -8884,65 +9321,8 @@
         </p:blipFill>
         <p:spPr>
           <a:xfrm>
-            <a:off x="384809" y="2831966"/>
-            <a:ext cx="3829044" cy="2871783"/>
-          </a:xfrm>
-        </p:spPr>
-      </p:pic>
-      <p:pic>
-        <p:nvPicPr>
-          <p:cNvPr id="5" name="Picture 4"/>
-          <p:cNvPicPr>
-            <a:picLocks noChangeAspect="1"/>
-          </p:cNvPicPr>
-          <p:nvPr/>
-        </p:nvPicPr>
-        <p:blipFill>
-          <a:blip r:embed="rId3">
-            <a:extLst>
-              <a:ext uri="{28A0092B-C50C-407E-A947-70E740481C1C}">
-                <a14:useLocalDpi xmlns:a14="http://schemas.microsoft.com/office/drawing/2010/main" val="0"/>
-              </a:ext>
-            </a:extLst>
-          </a:blip>
-          <a:stretch>
-            <a:fillRect/>
-          </a:stretch>
-        </p:blipFill>
-        <p:spPr>
-          <a:xfrm>
-            <a:off x="4100416" y="2831966"/>
-            <a:ext cx="3829044" cy="2871783"/>
-          </a:xfrm>
-          <a:prstGeom prst="rect">
-            <a:avLst/>
-          </a:prstGeom>
-        </p:spPr>
-      </p:pic>
-      <p:pic>
-        <p:nvPicPr>
-          <p:cNvPr id="6" name="Picture 5"/>
-          <p:cNvPicPr>
-            <a:picLocks noChangeAspect="1"/>
-          </p:cNvPicPr>
-          <p:nvPr/>
-        </p:nvPicPr>
-        <p:blipFill>
-          <a:blip r:embed="rId4">
-            <a:extLst>
-              <a:ext uri="{28A0092B-C50C-407E-A947-70E740481C1C}">
-                <a14:useLocalDpi xmlns:a14="http://schemas.microsoft.com/office/drawing/2010/main" val="0"/>
-              </a:ext>
-            </a:extLst>
-          </a:blip>
-          <a:stretch>
-            <a:fillRect/>
-          </a:stretch>
-        </p:blipFill>
-        <p:spPr>
-          <a:xfrm>
-            <a:off x="7929460" y="2831966"/>
-            <a:ext cx="3829044" cy="2871783"/>
+            <a:off x="2015128" y="2046654"/>
+            <a:ext cx="6944245" cy="4629497"/>
           </a:xfrm>
           <a:prstGeom prst="rect">
             <a:avLst/>
@@ -8952,7 +9332,7 @@
     </p:spTree>
     <p:extLst>
       <p:ext uri="{BB962C8B-B14F-4D97-AF65-F5344CB8AC3E}">
-        <p14:creationId xmlns:p14="http://schemas.microsoft.com/office/powerpoint/2010/main" val="1975327160"/>
+        <p14:creationId xmlns:p14="http://schemas.microsoft.com/office/powerpoint/2010/main" val="3786925155"/>
       </p:ext>
     </p:extLst>
   </p:cSld>

</xml_diff>